<commit_message>
Liste der E-Bauteile ergänzt
</commit_message>
<xml_diff>
--- a/docs/material/FISI E-Bauteile.pptx
+++ b/docs/material/FISI E-Bauteile.pptx
@@ -104,15 +104,12 @@
       </a:defRPr>
     </a:lvl9pPr>
   </p:defaultTextStyle>
+  <p:extLst>
+    <p:ext uri="{EFAFB233-063F-42B5-8137-9DF3F51BA10A}">
+      <p15:sldGuideLst xmlns:p15="http://schemas.microsoft.com/office/powerpoint/2012/main"/>
+    </p:ext>
+  </p:extLst>
 </p:presentation>
-</file>
-
-<file path=ppt/revisionInfo.xml><?xml version="1.0" encoding="utf-8"?>
-<p1510:revInfo xmlns:a="http://schemas.openxmlformats.org/drawingml/2006/main" xmlns:r="http://schemas.openxmlformats.org/officeDocument/2006/relationships" xmlns:p1510="http://schemas.microsoft.com/office/powerpoint/2015/10/main">
-  <p1510:revLst>
-    <p1510:client id="{EFB5112A-B092-46D3-986A-F24FFE20BB19}" v="13" dt="2024-07-09T08:06:56.935"/>
-  </p1510:revLst>
-</p1510:revInfo>
 </file>
 
 <file path=ppt/changesInfos/changesInfo1.xml><?xml version="1.0" encoding="utf-8"?>
@@ -130,598 +127,30 @@
           <pc:docMk/>
           <pc:sldMk cId="3349967969" sldId="256"/>
         </pc:sldMkLst>
+      </pc:sldChg>
+    </pc:docChg>
+  </pc:docChgLst>
+  <pc:docChgLst>
+    <pc:chgData name="André Neumann" userId="e07587b9-5803-4dd8-acfc-2a6eb396eb4f" providerId="ADAL" clId="{74DFB93F-888F-4A8A-9513-6A3B9927C67A}"/>
+    <pc:docChg chg="modSld">
+      <pc:chgData name="André Neumann" userId="e07587b9-5803-4dd8-acfc-2a6eb396eb4f" providerId="ADAL" clId="{74DFB93F-888F-4A8A-9513-6A3B9927C67A}" dt="2025-03-17T11:41:41.371" v="0" actId="207"/>
+      <pc:docMkLst>
+        <pc:docMk/>
+      </pc:docMkLst>
+      <pc:sldChg chg="modSp mod">
+        <pc:chgData name="André Neumann" userId="e07587b9-5803-4dd8-acfc-2a6eb396eb4f" providerId="ADAL" clId="{74DFB93F-888F-4A8A-9513-6A3B9927C67A}" dt="2025-03-17T11:41:41.371" v="0" actId="207"/>
+        <pc:sldMkLst>
+          <pc:docMk/>
+          <pc:sldMk cId="3349967969" sldId="256"/>
+        </pc:sldMkLst>
         <pc:spChg chg="mod">
-          <ac:chgData name="Andre Neumann" userId="e07587b9-5803-4dd8-acfc-2a6eb396eb4f" providerId="ADAL" clId="{EFB5112A-B092-46D3-986A-F24FFE20BB19}" dt="2024-07-09T08:08:03.673" v="914" actId="1076"/>
-          <ac:spMkLst>
-            <pc:docMk/>
-            <pc:sldMk cId="3349967969" sldId="256"/>
-            <ac:spMk id="6" creationId="{A1307ECC-5C19-3EB3-D452-9133CED292AE}"/>
-          </ac:spMkLst>
-        </pc:spChg>
-        <pc:spChg chg="mod">
-          <ac:chgData name="Andre Neumann" userId="e07587b9-5803-4dd8-acfc-2a6eb396eb4f" providerId="ADAL" clId="{EFB5112A-B092-46D3-986A-F24FFE20BB19}" dt="2024-07-09T08:08:03.673" v="914" actId="1076"/>
-          <ac:spMkLst>
-            <pc:docMk/>
-            <pc:sldMk cId="3349967969" sldId="256"/>
-            <ac:spMk id="7" creationId="{14A1F35F-4459-7120-C2BC-259736042276}"/>
-          </ac:spMkLst>
-        </pc:spChg>
-        <pc:spChg chg="mod">
-          <ac:chgData name="Andre Neumann" userId="e07587b9-5803-4dd8-acfc-2a6eb396eb4f" providerId="ADAL" clId="{EFB5112A-B092-46D3-986A-F24FFE20BB19}" dt="2024-07-09T08:08:03.673" v="914" actId="1076"/>
-          <ac:spMkLst>
-            <pc:docMk/>
-            <pc:sldMk cId="3349967969" sldId="256"/>
-            <ac:spMk id="8" creationId="{31653A0C-4824-A838-34C0-C118E5F91C0D}"/>
-          </ac:spMkLst>
-        </pc:spChg>
-        <pc:spChg chg="mod">
-          <ac:chgData name="Andre Neumann" userId="e07587b9-5803-4dd8-acfc-2a6eb396eb4f" providerId="ADAL" clId="{EFB5112A-B092-46D3-986A-F24FFE20BB19}" dt="2024-07-09T08:08:03.673" v="914" actId="1076"/>
-          <ac:spMkLst>
-            <pc:docMk/>
-            <pc:sldMk cId="3349967969" sldId="256"/>
-            <ac:spMk id="9" creationId="{1C4750E4-30E6-A3B9-AA27-11CF3FABA2EE}"/>
-          </ac:spMkLst>
-        </pc:spChg>
-        <pc:spChg chg="mod">
-          <ac:chgData name="Andre Neumann" userId="e07587b9-5803-4dd8-acfc-2a6eb396eb4f" providerId="ADAL" clId="{EFB5112A-B092-46D3-986A-F24FFE20BB19}" dt="2024-07-09T08:08:03.673" v="914" actId="1076"/>
-          <ac:spMkLst>
-            <pc:docMk/>
-            <pc:sldMk cId="3349967969" sldId="256"/>
-            <ac:spMk id="10" creationId="{3A553C90-403A-0630-6A63-F903FDAEC09E}"/>
-          </ac:spMkLst>
-        </pc:spChg>
-        <pc:spChg chg="mod">
-          <ac:chgData name="Andre Neumann" userId="e07587b9-5803-4dd8-acfc-2a6eb396eb4f" providerId="ADAL" clId="{EFB5112A-B092-46D3-986A-F24FFE20BB19}" dt="2024-07-09T08:08:03.673" v="914" actId="1076"/>
-          <ac:spMkLst>
-            <pc:docMk/>
-            <pc:sldMk cId="3349967969" sldId="256"/>
-            <ac:spMk id="11" creationId="{C5CD64D9-7B5D-02AD-AE81-15616D1FD85D}"/>
-          </ac:spMkLst>
-        </pc:spChg>
-        <pc:spChg chg="mod">
-          <ac:chgData name="Andre Neumann" userId="e07587b9-5803-4dd8-acfc-2a6eb396eb4f" providerId="ADAL" clId="{EFB5112A-B092-46D3-986A-F24FFE20BB19}" dt="2024-07-09T08:08:03.673" v="914" actId="1076"/>
-          <ac:spMkLst>
-            <pc:docMk/>
-            <pc:sldMk cId="3349967969" sldId="256"/>
-            <ac:spMk id="12" creationId="{8E108E31-2D4B-A83D-CD2F-EF937F61BA6E}"/>
-          </ac:spMkLst>
-        </pc:spChg>
-        <pc:spChg chg="mod">
-          <ac:chgData name="Andre Neumann" userId="e07587b9-5803-4dd8-acfc-2a6eb396eb4f" providerId="ADAL" clId="{EFB5112A-B092-46D3-986A-F24FFE20BB19}" dt="2024-07-09T08:08:03.673" v="914" actId="1076"/>
-          <ac:spMkLst>
-            <pc:docMk/>
-            <pc:sldMk cId="3349967969" sldId="256"/>
-            <ac:spMk id="13" creationId="{84646BA5-FBB0-0AEA-3DD5-EA97F7B62414}"/>
-          </ac:spMkLst>
-        </pc:spChg>
-        <pc:spChg chg="mod">
-          <ac:chgData name="Andre Neumann" userId="e07587b9-5803-4dd8-acfc-2a6eb396eb4f" providerId="ADAL" clId="{EFB5112A-B092-46D3-986A-F24FFE20BB19}" dt="2024-07-09T08:08:03.673" v="914" actId="1076"/>
-          <ac:spMkLst>
-            <pc:docMk/>
-            <pc:sldMk cId="3349967969" sldId="256"/>
-            <ac:spMk id="14" creationId="{17CC95F7-DEC6-B218-47AA-E7029E276CFB}"/>
-          </ac:spMkLst>
-        </pc:spChg>
-        <pc:spChg chg="mod">
-          <ac:chgData name="Andre Neumann" userId="e07587b9-5803-4dd8-acfc-2a6eb396eb4f" providerId="ADAL" clId="{EFB5112A-B092-46D3-986A-F24FFE20BB19}" dt="2024-07-09T08:08:03.673" v="914" actId="1076"/>
-          <ac:spMkLst>
-            <pc:docMk/>
-            <pc:sldMk cId="3349967969" sldId="256"/>
-            <ac:spMk id="15" creationId="{57682EAD-6732-45B2-765C-291C773E960E}"/>
-          </ac:spMkLst>
-        </pc:spChg>
-        <pc:spChg chg="mod">
-          <ac:chgData name="Andre Neumann" userId="e07587b9-5803-4dd8-acfc-2a6eb396eb4f" providerId="ADAL" clId="{EFB5112A-B092-46D3-986A-F24FFE20BB19}" dt="2024-07-09T08:08:03.673" v="914" actId="1076"/>
-          <ac:spMkLst>
-            <pc:docMk/>
-            <pc:sldMk cId="3349967969" sldId="256"/>
-            <ac:spMk id="16" creationId="{F67F2F49-1E13-1288-7E11-A0F92690C843}"/>
-          </ac:spMkLst>
-        </pc:spChg>
-        <pc:spChg chg="mod">
-          <ac:chgData name="Andre Neumann" userId="e07587b9-5803-4dd8-acfc-2a6eb396eb4f" providerId="ADAL" clId="{EFB5112A-B092-46D3-986A-F24FFE20BB19}" dt="2024-07-09T08:08:03.673" v="914" actId="1076"/>
-          <ac:spMkLst>
-            <pc:docMk/>
-            <pc:sldMk cId="3349967969" sldId="256"/>
-            <ac:spMk id="17" creationId="{1F649080-E8AA-594B-79BD-1515B04B10F2}"/>
-          </ac:spMkLst>
-        </pc:spChg>
-        <pc:spChg chg="mod">
-          <ac:chgData name="Andre Neumann" userId="e07587b9-5803-4dd8-acfc-2a6eb396eb4f" providerId="ADAL" clId="{EFB5112A-B092-46D3-986A-F24FFE20BB19}" dt="2024-07-09T08:08:03.673" v="914" actId="1076"/>
-          <ac:spMkLst>
-            <pc:docMk/>
-            <pc:sldMk cId="3349967969" sldId="256"/>
-            <ac:spMk id="18" creationId="{40B2116F-CBF1-FDD6-F77C-BF0FF2F9F7E2}"/>
-          </ac:spMkLst>
-        </pc:spChg>
-        <pc:spChg chg="mod">
-          <ac:chgData name="Andre Neumann" userId="e07587b9-5803-4dd8-acfc-2a6eb396eb4f" providerId="ADAL" clId="{EFB5112A-B092-46D3-986A-F24FFE20BB19}" dt="2024-07-09T08:08:03.673" v="914" actId="1076"/>
-          <ac:spMkLst>
-            <pc:docMk/>
-            <pc:sldMk cId="3349967969" sldId="256"/>
-            <ac:spMk id="19" creationId="{2EF45A4E-0029-1DC8-E9E7-C3E22F762B38}"/>
-          </ac:spMkLst>
-        </pc:spChg>
-        <pc:spChg chg="mod">
-          <ac:chgData name="Andre Neumann" userId="e07587b9-5803-4dd8-acfc-2a6eb396eb4f" providerId="ADAL" clId="{EFB5112A-B092-46D3-986A-F24FFE20BB19}" dt="2024-07-09T08:08:03.673" v="914" actId="1076"/>
-          <ac:spMkLst>
-            <pc:docMk/>
-            <pc:sldMk cId="3349967969" sldId="256"/>
-            <ac:spMk id="20" creationId="{C3125D65-E8F0-4613-0417-A8E7AE4CFD1C}"/>
-          </ac:spMkLst>
-        </pc:spChg>
-        <pc:spChg chg="mod">
-          <ac:chgData name="Andre Neumann" userId="e07587b9-5803-4dd8-acfc-2a6eb396eb4f" providerId="ADAL" clId="{EFB5112A-B092-46D3-986A-F24FFE20BB19}" dt="2024-07-09T08:08:03.673" v="914" actId="1076"/>
-          <ac:spMkLst>
-            <pc:docMk/>
-            <pc:sldMk cId="3349967969" sldId="256"/>
-            <ac:spMk id="21" creationId="{01EA96E0-4091-BBCB-17A7-AE0BAA7A2944}"/>
-          </ac:spMkLst>
-        </pc:spChg>
-        <pc:spChg chg="mod">
-          <ac:chgData name="Andre Neumann" userId="e07587b9-5803-4dd8-acfc-2a6eb396eb4f" providerId="ADAL" clId="{EFB5112A-B092-46D3-986A-F24FFE20BB19}" dt="2024-07-09T08:08:03.673" v="914" actId="1076"/>
-          <ac:spMkLst>
-            <pc:docMk/>
-            <pc:sldMk cId="3349967969" sldId="256"/>
-            <ac:spMk id="22" creationId="{735EA25F-E55C-596A-69BB-3BF2176AA50E}"/>
-          </ac:spMkLst>
-        </pc:spChg>
-        <pc:spChg chg="mod">
-          <ac:chgData name="Andre Neumann" userId="e07587b9-5803-4dd8-acfc-2a6eb396eb4f" providerId="ADAL" clId="{EFB5112A-B092-46D3-986A-F24FFE20BB19}" dt="2024-07-09T08:08:28.002" v="915" actId="113"/>
-          <ac:spMkLst>
-            <pc:docMk/>
-            <pc:sldMk cId="3349967969" sldId="256"/>
-            <ac:spMk id="23" creationId="{055F24C6-42A6-C8F2-A356-3E6F1F55B765}"/>
-          </ac:spMkLst>
-        </pc:spChg>
-        <pc:spChg chg="mod">
-          <ac:chgData name="Andre Neumann" userId="e07587b9-5803-4dd8-acfc-2a6eb396eb4f" providerId="ADAL" clId="{EFB5112A-B092-46D3-986A-F24FFE20BB19}" dt="2024-07-09T08:08:28.002" v="915" actId="113"/>
-          <ac:spMkLst>
-            <pc:docMk/>
-            <pc:sldMk cId="3349967969" sldId="256"/>
-            <ac:spMk id="24" creationId="{258BFCBF-BC03-6FA8-F20E-24363D288C8F}"/>
-          </ac:spMkLst>
-        </pc:spChg>
-        <pc:spChg chg="mod">
-          <ac:chgData name="Andre Neumann" userId="e07587b9-5803-4dd8-acfc-2a6eb396eb4f" providerId="ADAL" clId="{EFB5112A-B092-46D3-986A-F24FFE20BB19}" dt="2024-07-09T08:08:28.002" v="915" actId="113"/>
-          <ac:spMkLst>
-            <pc:docMk/>
-            <pc:sldMk cId="3349967969" sldId="256"/>
-            <ac:spMk id="25" creationId="{8998F5DE-B6BA-F85F-9813-291D60C5B9B7}"/>
-          </ac:spMkLst>
-        </pc:spChg>
-        <pc:spChg chg="mod">
-          <ac:chgData name="Andre Neumann" userId="e07587b9-5803-4dd8-acfc-2a6eb396eb4f" providerId="ADAL" clId="{EFB5112A-B092-46D3-986A-F24FFE20BB19}" dt="2024-07-09T08:08:03.673" v="914" actId="1076"/>
-          <ac:spMkLst>
-            <pc:docMk/>
-            <pc:sldMk cId="3349967969" sldId="256"/>
-            <ac:spMk id="26" creationId="{2C3F9573-B003-A88E-B37B-5313D71C6B79}"/>
-          </ac:spMkLst>
-        </pc:spChg>
-        <pc:spChg chg="mod">
-          <ac:chgData name="Andre Neumann" userId="e07587b9-5803-4dd8-acfc-2a6eb396eb4f" providerId="ADAL" clId="{EFB5112A-B092-46D3-986A-F24FFE20BB19}" dt="2024-07-09T08:08:03.673" v="914" actId="1076"/>
-          <ac:spMkLst>
-            <pc:docMk/>
-            <pc:sldMk cId="3349967969" sldId="256"/>
-            <ac:spMk id="38" creationId="{8191BA2A-4172-360F-D729-AC5230B4AEEB}"/>
-          </ac:spMkLst>
-        </pc:spChg>
-        <pc:spChg chg="mod">
-          <ac:chgData name="Andre Neumann" userId="e07587b9-5803-4dd8-acfc-2a6eb396eb4f" providerId="ADAL" clId="{EFB5112A-B092-46D3-986A-F24FFE20BB19}" dt="2024-07-09T08:08:03.673" v="914" actId="1076"/>
-          <ac:spMkLst>
-            <pc:docMk/>
-            <pc:sldMk cId="3349967969" sldId="256"/>
-            <ac:spMk id="42" creationId="{30533780-93C2-1114-EF30-E493E0EA136A}"/>
-          </ac:spMkLst>
-        </pc:spChg>
-        <pc:spChg chg="mod">
-          <ac:chgData name="Andre Neumann" userId="e07587b9-5803-4dd8-acfc-2a6eb396eb4f" providerId="ADAL" clId="{EFB5112A-B092-46D3-986A-F24FFE20BB19}" dt="2024-07-09T08:08:03.673" v="914" actId="1076"/>
-          <ac:spMkLst>
-            <pc:docMk/>
-            <pc:sldMk cId="3349967969" sldId="256"/>
-            <ac:spMk id="45" creationId="{3C821322-42E6-AD3C-D15F-9621B3C0B63A}"/>
-          </ac:spMkLst>
-        </pc:spChg>
-        <pc:spChg chg="mod">
-          <ac:chgData name="Andre Neumann" userId="e07587b9-5803-4dd8-acfc-2a6eb396eb4f" providerId="ADAL" clId="{EFB5112A-B092-46D3-986A-F24FFE20BB19}" dt="2024-07-09T08:08:03.673" v="914" actId="1076"/>
-          <ac:spMkLst>
-            <pc:docMk/>
-            <pc:sldMk cId="3349967969" sldId="256"/>
-            <ac:spMk id="50" creationId="{856C2CAB-7986-EC0C-A9E4-FCED07ACB056}"/>
-          </ac:spMkLst>
-        </pc:spChg>
-        <pc:spChg chg="mod">
-          <ac:chgData name="Andre Neumann" userId="e07587b9-5803-4dd8-acfc-2a6eb396eb4f" providerId="ADAL" clId="{EFB5112A-B092-46D3-986A-F24FFE20BB19}" dt="2024-07-09T08:08:03.673" v="914" actId="1076"/>
-          <ac:spMkLst>
-            <pc:docMk/>
-            <pc:sldMk cId="3349967969" sldId="256"/>
-            <ac:spMk id="56" creationId="{A7409F82-6776-9C66-605A-A0AF62578327}"/>
-          </ac:spMkLst>
-        </pc:spChg>
-        <pc:spChg chg="mod">
-          <ac:chgData name="Andre Neumann" userId="e07587b9-5803-4dd8-acfc-2a6eb396eb4f" providerId="ADAL" clId="{EFB5112A-B092-46D3-986A-F24FFE20BB19}" dt="2024-07-09T08:08:03.673" v="914" actId="1076"/>
-          <ac:spMkLst>
-            <pc:docMk/>
-            <pc:sldMk cId="3349967969" sldId="256"/>
-            <ac:spMk id="57" creationId="{21588203-80A5-3A7E-B131-28E049646552}"/>
-          </ac:spMkLst>
-        </pc:spChg>
-        <pc:spChg chg="mod">
-          <ac:chgData name="Andre Neumann" userId="e07587b9-5803-4dd8-acfc-2a6eb396eb4f" providerId="ADAL" clId="{EFB5112A-B092-46D3-986A-F24FFE20BB19}" dt="2024-07-09T08:08:03.673" v="914" actId="1076"/>
-          <ac:spMkLst>
-            <pc:docMk/>
-            <pc:sldMk cId="3349967969" sldId="256"/>
-            <ac:spMk id="58" creationId="{803AA72D-55A7-AE88-C772-64AFE5635D82}"/>
-          </ac:spMkLst>
-        </pc:spChg>
-        <pc:spChg chg="mod">
-          <ac:chgData name="Andre Neumann" userId="e07587b9-5803-4dd8-acfc-2a6eb396eb4f" providerId="ADAL" clId="{EFB5112A-B092-46D3-986A-F24FFE20BB19}" dt="2024-07-09T08:08:03.673" v="914" actId="1076"/>
-          <ac:spMkLst>
-            <pc:docMk/>
-            <pc:sldMk cId="3349967969" sldId="256"/>
-            <ac:spMk id="59" creationId="{5C794CE5-5FBE-9E6B-730C-B480037C20F3}"/>
-          </ac:spMkLst>
-        </pc:spChg>
-        <pc:spChg chg="mod">
-          <ac:chgData name="Andre Neumann" userId="e07587b9-5803-4dd8-acfc-2a6eb396eb4f" providerId="ADAL" clId="{EFB5112A-B092-46D3-986A-F24FFE20BB19}" dt="2024-07-09T08:08:03.673" v="914" actId="1076"/>
-          <ac:spMkLst>
-            <pc:docMk/>
-            <pc:sldMk cId="3349967969" sldId="256"/>
-            <ac:spMk id="60" creationId="{C9B63E65-0907-7B1F-9328-DFA08D11762B}"/>
-          </ac:spMkLst>
-        </pc:spChg>
-        <pc:spChg chg="mod">
-          <ac:chgData name="Andre Neumann" userId="e07587b9-5803-4dd8-acfc-2a6eb396eb4f" providerId="ADAL" clId="{EFB5112A-B092-46D3-986A-F24FFE20BB19}" dt="2024-07-09T08:08:03.673" v="914" actId="1076"/>
-          <ac:spMkLst>
-            <pc:docMk/>
-            <pc:sldMk cId="3349967969" sldId="256"/>
-            <ac:spMk id="61" creationId="{177AB107-90E1-4784-DE15-6FB368930D59}"/>
-          </ac:spMkLst>
-        </pc:spChg>
-        <pc:spChg chg="mod">
-          <ac:chgData name="Andre Neumann" userId="e07587b9-5803-4dd8-acfc-2a6eb396eb4f" providerId="ADAL" clId="{EFB5112A-B092-46D3-986A-F24FFE20BB19}" dt="2024-07-09T08:08:03.673" v="914" actId="1076"/>
-          <ac:spMkLst>
-            <pc:docMk/>
-            <pc:sldMk cId="3349967969" sldId="256"/>
-            <ac:spMk id="62" creationId="{7D511F91-72B7-1233-C57B-D1586E02E5BB}"/>
-          </ac:spMkLst>
-        </pc:spChg>
-        <pc:spChg chg="mod">
-          <ac:chgData name="Andre Neumann" userId="e07587b9-5803-4dd8-acfc-2a6eb396eb4f" providerId="ADAL" clId="{EFB5112A-B092-46D3-986A-F24FFE20BB19}" dt="2024-07-09T08:08:03.673" v="914" actId="1076"/>
-          <ac:spMkLst>
-            <pc:docMk/>
-            <pc:sldMk cId="3349967969" sldId="256"/>
-            <ac:spMk id="63" creationId="{DE39CD7B-510B-FD1F-C932-B2D4C3755308}"/>
-          </ac:spMkLst>
-        </pc:spChg>
-        <pc:spChg chg="mod">
-          <ac:chgData name="Andre Neumann" userId="e07587b9-5803-4dd8-acfc-2a6eb396eb4f" providerId="ADAL" clId="{EFB5112A-B092-46D3-986A-F24FFE20BB19}" dt="2024-07-09T08:08:03.673" v="914" actId="1076"/>
-          <ac:spMkLst>
-            <pc:docMk/>
-            <pc:sldMk cId="3349967969" sldId="256"/>
-            <ac:spMk id="64" creationId="{EB23C414-9177-1539-B1C1-42251C148895}"/>
-          </ac:spMkLst>
-        </pc:spChg>
-        <pc:spChg chg="mod">
-          <ac:chgData name="Andre Neumann" userId="e07587b9-5803-4dd8-acfc-2a6eb396eb4f" providerId="ADAL" clId="{EFB5112A-B092-46D3-986A-F24FFE20BB19}" dt="2024-07-09T08:08:03.673" v="914" actId="1076"/>
-          <ac:spMkLst>
-            <pc:docMk/>
-            <pc:sldMk cId="3349967969" sldId="256"/>
-            <ac:spMk id="66" creationId="{533FEDE6-D721-3983-6C01-9E74BADC6B60}"/>
-          </ac:spMkLst>
-        </pc:spChg>
-        <pc:spChg chg="mod">
-          <ac:chgData name="Andre Neumann" userId="e07587b9-5803-4dd8-acfc-2a6eb396eb4f" providerId="ADAL" clId="{EFB5112A-B092-46D3-986A-F24FFE20BB19}" dt="2024-07-09T08:08:03.673" v="914" actId="1076"/>
-          <ac:spMkLst>
-            <pc:docMk/>
-            <pc:sldMk cId="3349967969" sldId="256"/>
-            <ac:spMk id="67" creationId="{B9DDAC39-0EB9-C6B6-9D00-FA1C13129521}"/>
-          </ac:spMkLst>
-        </pc:spChg>
-        <pc:spChg chg="mod">
-          <ac:chgData name="Andre Neumann" userId="e07587b9-5803-4dd8-acfc-2a6eb396eb4f" providerId="ADAL" clId="{EFB5112A-B092-46D3-986A-F24FFE20BB19}" dt="2024-07-09T08:08:03.673" v="914" actId="1076"/>
-          <ac:spMkLst>
-            <pc:docMk/>
-            <pc:sldMk cId="3349967969" sldId="256"/>
-            <ac:spMk id="68" creationId="{82D0AF38-3561-77A9-90B7-3701CED34EDD}"/>
-          </ac:spMkLst>
-        </pc:spChg>
-        <pc:spChg chg="mod">
-          <ac:chgData name="Andre Neumann" userId="e07587b9-5803-4dd8-acfc-2a6eb396eb4f" providerId="ADAL" clId="{EFB5112A-B092-46D3-986A-F24FFE20BB19}" dt="2024-07-09T08:08:03.673" v="914" actId="1076"/>
-          <ac:spMkLst>
-            <pc:docMk/>
-            <pc:sldMk cId="3349967969" sldId="256"/>
-            <ac:spMk id="69" creationId="{B3D9A414-A25C-B387-C560-1E39F5410DA7}"/>
-          </ac:spMkLst>
-        </pc:spChg>
-        <pc:spChg chg="mod">
-          <ac:chgData name="Andre Neumann" userId="e07587b9-5803-4dd8-acfc-2a6eb396eb4f" providerId="ADAL" clId="{EFB5112A-B092-46D3-986A-F24FFE20BB19}" dt="2024-07-09T08:08:03.673" v="914" actId="1076"/>
-          <ac:spMkLst>
-            <pc:docMk/>
-            <pc:sldMk cId="3349967969" sldId="256"/>
-            <ac:spMk id="70" creationId="{B8C073C0-F7D9-B4F5-4481-348B20525481}"/>
-          </ac:spMkLst>
-        </pc:spChg>
-        <pc:spChg chg="mod">
-          <ac:chgData name="Andre Neumann" userId="e07587b9-5803-4dd8-acfc-2a6eb396eb4f" providerId="ADAL" clId="{EFB5112A-B092-46D3-986A-F24FFE20BB19}" dt="2024-07-09T08:08:03.673" v="914" actId="1076"/>
-          <ac:spMkLst>
-            <pc:docMk/>
-            <pc:sldMk cId="3349967969" sldId="256"/>
-            <ac:spMk id="71" creationId="{64B2725C-FBE9-6D91-5281-8099A8721C2C}"/>
-          </ac:spMkLst>
-        </pc:spChg>
-        <pc:spChg chg="mod">
-          <ac:chgData name="Andre Neumann" userId="e07587b9-5803-4dd8-acfc-2a6eb396eb4f" providerId="ADAL" clId="{EFB5112A-B092-46D3-986A-F24FFE20BB19}" dt="2024-07-09T08:08:03.673" v="914" actId="1076"/>
-          <ac:spMkLst>
-            <pc:docMk/>
-            <pc:sldMk cId="3349967969" sldId="256"/>
-            <ac:spMk id="72" creationId="{F117BD9C-D5C6-C331-CD3A-26FBF05DA3C9}"/>
-          </ac:spMkLst>
-        </pc:spChg>
-        <pc:spChg chg="mod">
-          <ac:chgData name="Andre Neumann" userId="e07587b9-5803-4dd8-acfc-2a6eb396eb4f" providerId="ADAL" clId="{EFB5112A-B092-46D3-986A-F24FFE20BB19}" dt="2024-07-09T08:08:03.673" v="914" actId="1076"/>
-          <ac:spMkLst>
-            <pc:docMk/>
-            <pc:sldMk cId="3349967969" sldId="256"/>
-            <ac:spMk id="73" creationId="{07A4D80A-A3D4-65BE-65FB-7487D0D3B8EA}"/>
-          </ac:spMkLst>
-        </pc:spChg>
-        <pc:spChg chg="add mod">
-          <ac:chgData name="Andre Neumann" userId="e07587b9-5803-4dd8-acfc-2a6eb396eb4f" providerId="ADAL" clId="{EFB5112A-B092-46D3-986A-F24FFE20BB19}" dt="2024-07-09T08:08:03.673" v="914" actId="1076"/>
-          <ac:spMkLst>
-            <pc:docMk/>
-            <pc:sldMk cId="3349967969" sldId="256"/>
-            <ac:spMk id="74" creationId="{4B953053-B948-7863-5674-927EA89EFC91}"/>
-          </ac:spMkLst>
-        </pc:spChg>
-        <pc:spChg chg="add del mod">
-          <ac:chgData name="Andre Neumann" userId="e07587b9-5803-4dd8-acfc-2a6eb396eb4f" providerId="ADAL" clId="{EFB5112A-B092-46D3-986A-F24FFE20BB19}" dt="2024-07-09T08:00:32.046" v="67" actId="478"/>
-          <ac:spMkLst>
-            <pc:docMk/>
-            <pc:sldMk cId="3349967969" sldId="256"/>
-            <ac:spMk id="75" creationId="{B923172B-BD4A-21D8-53D2-AC0A922BF6FB}"/>
-          </ac:spMkLst>
-        </pc:spChg>
-        <pc:spChg chg="add mod">
-          <ac:chgData name="Andre Neumann" userId="e07587b9-5803-4dd8-acfc-2a6eb396eb4f" providerId="ADAL" clId="{EFB5112A-B092-46D3-986A-F24FFE20BB19}" dt="2024-07-09T08:08:03.673" v="914" actId="1076"/>
-          <ac:spMkLst>
-            <pc:docMk/>
-            <pc:sldMk cId="3349967969" sldId="256"/>
-            <ac:spMk id="76" creationId="{00632919-E2E6-CA07-DEEB-9C68429CDCC5}"/>
-          </ac:spMkLst>
-        </pc:spChg>
-        <pc:spChg chg="add mod">
-          <ac:chgData name="Andre Neumann" userId="e07587b9-5803-4dd8-acfc-2a6eb396eb4f" providerId="ADAL" clId="{EFB5112A-B092-46D3-986A-F24FFE20BB19}" dt="2024-07-09T08:08:03.673" v="914" actId="1076"/>
-          <ac:spMkLst>
-            <pc:docMk/>
-            <pc:sldMk cId="3349967969" sldId="256"/>
-            <ac:spMk id="77" creationId="{9DF61048-4B9E-EB34-7504-729FBD4273C5}"/>
-          </ac:spMkLst>
-        </pc:spChg>
-        <pc:spChg chg="add mod">
-          <ac:chgData name="Andre Neumann" userId="e07587b9-5803-4dd8-acfc-2a6eb396eb4f" providerId="ADAL" clId="{EFB5112A-B092-46D3-986A-F24FFE20BB19}" dt="2024-07-09T08:08:03.673" v="914" actId="1076"/>
-          <ac:spMkLst>
-            <pc:docMk/>
-            <pc:sldMk cId="3349967969" sldId="256"/>
-            <ac:spMk id="78" creationId="{CBF6FE84-CBA2-78C1-9F2B-E3A85694185C}"/>
-          </ac:spMkLst>
-        </pc:spChg>
-        <pc:spChg chg="add mod">
-          <ac:chgData name="Andre Neumann" userId="e07587b9-5803-4dd8-acfc-2a6eb396eb4f" providerId="ADAL" clId="{EFB5112A-B092-46D3-986A-F24FFE20BB19}" dt="2024-07-09T08:08:03.673" v="914" actId="1076"/>
-          <ac:spMkLst>
-            <pc:docMk/>
-            <pc:sldMk cId="3349967969" sldId="256"/>
-            <ac:spMk id="79" creationId="{F371C82F-5577-25E9-ABDA-E48E42A8F9B6}"/>
-          </ac:spMkLst>
-        </pc:spChg>
-        <pc:spChg chg="add mod">
-          <ac:chgData name="Andre Neumann" userId="e07587b9-5803-4dd8-acfc-2a6eb396eb4f" providerId="ADAL" clId="{EFB5112A-B092-46D3-986A-F24FFE20BB19}" dt="2024-07-09T08:08:03.673" v="914" actId="1076"/>
-          <ac:spMkLst>
-            <pc:docMk/>
-            <pc:sldMk cId="3349967969" sldId="256"/>
-            <ac:spMk id="80" creationId="{20BE919C-16DF-E29A-DDED-BFF4DEA955A6}"/>
-          </ac:spMkLst>
-        </pc:spChg>
-        <pc:spChg chg="add mod">
-          <ac:chgData name="Andre Neumann" userId="e07587b9-5803-4dd8-acfc-2a6eb396eb4f" providerId="ADAL" clId="{EFB5112A-B092-46D3-986A-F24FFE20BB19}" dt="2024-07-09T08:08:03.673" v="914" actId="1076"/>
-          <ac:spMkLst>
-            <pc:docMk/>
-            <pc:sldMk cId="3349967969" sldId="256"/>
-            <ac:spMk id="81" creationId="{B0582318-F52E-AE34-8A33-E330B2BAE36D}"/>
-          </ac:spMkLst>
-        </pc:spChg>
-        <pc:spChg chg="add mod">
-          <ac:chgData name="Andre Neumann" userId="e07587b9-5803-4dd8-acfc-2a6eb396eb4f" providerId="ADAL" clId="{EFB5112A-B092-46D3-986A-F24FFE20BB19}" dt="2024-07-09T08:08:03.673" v="914" actId="1076"/>
-          <ac:spMkLst>
-            <pc:docMk/>
-            <pc:sldMk cId="3349967969" sldId="256"/>
-            <ac:spMk id="82" creationId="{E7204583-8AFF-2997-1826-0770BD194AA7}"/>
-          </ac:spMkLst>
-        </pc:spChg>
-        <pc:spChg chg="add mod">
-          <ac:chgData name="Andre Neumann" userId="e07587b9-5803-4dd8-acfc-2a6eb396eb4f" providerId="ADAL" clId="{EFB5112A-B092-46D3-986A-F24FFE20BB19}" dt="2024-07-09T08:08:03.673" v="914" actId="1076"/>
-          <ac:spMkLst>
-            <pc:docMk/>
-            <pc:sldMk cId="3349967969" sldId="256"/>
-            <ac:spMk id="83" creationId="{F7289529-9BCE-5381-D944-164B50B480C2}"/>
-          </ac:spMkLst>
-        </pc:spChg>
-        <pc:spChg chg="add mod">
-          <ac:chgData name="Andre Neumann" userId="e07587b9-5803-4dd8-acfc-2a6eb396eb4f" providerId="ADAL" clId="{EFB5112A-B092-46D3-986A-F24FFE20BB19}" dt="2024-07-09T08:08:03.673" v="914" actId="1076"/>
+          <ac:chgData name="André Neumann" userId="e07587b9-5803-4dd8-acfc-2a6eb396eb4f" providerId="ADAL" clId="{74DFB93F-888F-4A8A-9513-6A3B9927C67A}" dt="2025-03-17T11:41:41.371" v="0" actId="207"/>
           <ac:spMkLst>
             <pc:docMk/>
             <pc:sldMk cId="3349967969" sldId="256"/>
             <ac:spMk id="84" creationId="{E63FDA67-C51E-06AD-3133-5EFF66BAAE61}"/>
           </ac:spMkLst>
         </pc:spChg>
-        <pc:spChg chg="add mod">
-          <ac:chgData name="Andre Neumann" userId="e07587b9-5803-4dd8-acfc-2a6eb396eb4f" providerId="ADAL" clId="{EFB5112A-B092-46D3-986A-F24FFE20BB19}" dt="2024-07-09T08:07:55.464" v="913" actId="1076"/>
-          <ac:spMkLst>
-            <pc:docMk/>
-            <pc:sldMk cId="3349967969" sldId="256"/>
-            <ac:spMk id="86" creationId="{F68127C1-BF48-B111-FD87-1DDF544F5B3A}"/>
-          </ac:spMkLst>
-        </pc:spChg>
-        <pc:spChg chg="add mod">
-          <ac:chgData name="Andre Neumann" userId="e07587b9-5803-4dd8-acfc-2a6eb396eb4f" providerId="ADAL" clId="{EFB5112A-B092-46D3-986A-F24FFE20BB19}" dt="2024-07-09T08:07:44.293" v="912" actId="207"/>
-          <ac:spMkLst>
-            <pc:docMk/>
-            <pc:sldMk cId="3349967969" sldId="256"/>
-            <ac:spMk id="87" creationId="{923DBFC9-A53B-5280-5B89-BA38D2F1DA9F}"/>
-          </ac:spMkLst>
-        </pc:spChg>
-        <pc:picChg chg="mod">
-          <ac:chgData name="Andre Neumann" userId="e07587b9-5803-4dd8-acfc-2a6eb396eb4f" providerId="ADAL" clId="{EFB5112A-B092-46D3-986A-F24FFE20BB19}" dt="2024-07-09T08:08:03.673" v="914" actId="1076"/>
-          <ac:picMkLst>
-            <pc:docMk/>
-            <pc:sldMk cId="3349967969" sldId="256"/>
-            <ac:picMk id="5" creationId="{66C3E7BE-FA5D-0F21-B948-3F5A2F842454}"/>
-          </ac:picMkLst>
-        </pc:picChg>
-        <pc:picChg chg="add mod">
-          <ac:chgData name="Andre Neumann" userId="e07587b9-5803-4dd8-acfc-2a6eb396eb4f" providerId="ADAL" clId="{EFB5112A-B092-46D3-986A-F24FFE20BB19}" dt="2024-07-09T08:06:48.654" v="864" actId="1076"/>
-          <ac:picMkLst>
-            <pc:docMk/>
-            <pc:sldMk cId="3349967969" sldId="256"/>
-            <ac:picMk id="85" creationId="{5908FCDC-FDB4-8B30-1707-68BEECEFD443}"/>
-          </ac:picMkLst>
-        </pc:picChg>
-        <pc:cxnChg chg="mod">
-          <ac:chgData name="Andre Neumann" userId="e07587b9-5803-4dd8-acfc-2a6eb396eb4f" providerId="ADAL" clId="{EFB5112A-B092-46D3-986A-F24FFE20BB19}" dt="2024-07-09T08:08:03.673" v="914" actId="1076"/>
-          <ac:cxnSpMkLst>
-            <pc:docMk/>
-            <pc:sldMk cId="3349967969" sldId="256"/>
-            <ac:cxnSpMk id="30" creationId="{0070B0A5-6FD7-DEBB-6F18-70354AB3FFB0}"/>
-          </ac:cxnSpMkLst>
-        </pc:cxnChg>
-        <pc:cxnChg chg="mod">
-          <ac:chgData name="Andre Neumann" userId="e07587b9-5803-4dd8-acfc-2a6eb396eb4f" providerId="ADAL" clId="{EFB5112A-B092-46D3-986A-F24FFE20BB19}" dt="2024-07-09T08:08:03.673" v="914" actId="1076"/>
-          <ac:cxnSpMkLst>
-            <pc:docMk/>
-            <pc:sldMk cId="3349967969" sldId="256"/>
-            <ac:cxnSpMk id="31" creationId="{F275E9A3-9B56-D55A-F66E-A0CCDC9379F1}"/>
-          </ac:cxnSpMkLst>
-        </pc:cxnChg>
-        <pc:cxnChg chg="mod">
-          <ac:chgData name="Andre Neumann" userId="e07587b9-5803-4dd8-acfc-2a6eb396eb4f" providerId="ADAL" clId="{EFB5112A-B092-46D3-986A-F24FFE20BB19}" dt="2024-07-09T08:08:03.673" v="914" actId="1076"/>
-          <ac:cxnSpMkLst>
-            <pc:docMk/>
-            <pc:sldMk cId="3349967969" sldId="256"/>
-            <ac:cxnSpMk id="34" creationId="{01E30BBA-B79C-8777-3B95-E7B4B72D6B86}"/>
-          </ac:cxnSpMkLst>
-        </pc:cxnChg>
-        <pc:cxnChg chg="mod">
-          <ac:chgData name="Andre Neumann" userId="e07587b9-5803-4dd8-acfc-2a6eb396eb4f" providerId="ADAL" clId="{EFB5112A-B092-46D3-986A-F24FFE20BB19}" dt="2024-07-09T08:08:03.673" v="914" actId="1076"/>
-          <ac:cxnSpMkLst>
-            <pc:docMk/>
-            <pc:sldMk cId="3349967969" sldId="256"/>
-            <ac:cxnSpMk id="35" creationId="{0A360025-B979-BDB9-03D8-E70EF173EFFC}"/>
-          </ac:cxnSpMkLst>
-        </pc:cxnChg>
-        <pc:cxnChg chg="mod">
-          <ac:chgData name="Andre Neumann" userId="e07587b9-5803-4dd8-acfc-2a6eb396eb4f" providerId="ADAL" clId="{EFB5112A-B092-46D3-986A-F24FFE20BB19}" dt="2024-07-09T08:08:03.673" v="914" actId="1076"/>
-          <ac:cxnSpMkLst>
-            <pc:docMk/>
-            <pc:sldMk cId="3349967969" sldId="256"/>
-            <ac:cxnSpMk id="36" creationId="{A312B065-AFCB-526D-64E7-065AC0502F5C}"/>
-          </ac:cxnSpMkLst>
-        </pc:cxnChg>
-        <pc:cxnChg chg="mod">
-          <ac:chgData name="Andre Neumann" userId="e07587b9-5803-4dd8-acfc-2a6eb396eb4f" providerId="ADAL" clId="{EFB5112A-B092-46D3-986A-F24FFE20BB19}" dt="2024-07-09T08:08:03.673" v="914" actId="1076"/>
-          <ac:cxnSpMkLst>
-            <pc:docMk/>
-            <pc:sldMk cId="3349967969" sldId="256"/>
-            <ac:cxnSpMk id="37" creationId="{5BB48C8D-77C1-7F91-3A8A-9C89EC50B3BF}"/>
-          </ac:cxnSpMkLst>
-        </pc:cxnChg>
-        <pc:cxnChg chg="mod">
-          <ac:chgData name="Andre Neumann" userId="e07587b9-5803-4dd8-acfc-2a6eb396eb4f" providerId="ADAL" clId="{EFB5112A-B092-46D3-986A-F24FFE20BB19}" dt="2024-07-09T08:08:03.673" v="914" actId="1076"/>
-          <ac:cxnSpMkLst>
-            <pc:docMk/>
-            <pc:sldMk cId="3349967969" sldId="256"/>
-            <ac:cxnSpMk id="39" creationId="{DEA27BF8-78E8-D735-0BB7-B4EAD470B830}"/>
-          </ac:cxnSpMkLst>
-        </pc:cxnChg>
-        <pc:cxnChg chg="mod">
-          <ac:chgData name="Andre Neumann" userId="e07587b9-5803-4dd8-acfc-2a6eb396eb4f" providerId="ADAL" clId="{EFB5112A-B092-46D3-986A-F24FFE20BB19}" dt="2024-07-09T08:08:03.673" v="914" actId="1076"/>
-          <ac:cxnSpMkLst>
-            <pc:docMk/>
-            <pc:sldMk cId="3349967969" sldId="256"/>
-            <ac:cxnSpMk id="41" creationId="{3D1ADAF8-2D6D-EDD5-8BD9-204C8DED8783}"/>
-          </ac:cxnSpMkLst>
-        </pc:cxnChg>
-        <pc:cxnChg chg="mod">
-          <ac:chgData name="Andre Neumann" userId="e07587b9-5803-4dd8-acfc-2a6eb396eb4f" providerId="ADAL" clId="{EFB5112A-B092-46D3-986A-F24FFE20BB19}" dt="2024-07-09T08:08:03.673" v="914" actId="1076"/>
-          <ac:cxnSpMkLst>
-            <pc:docMk/>
-            <pc:sldMk cId="3349967969" sldId="256"/>
-            <ac:cxnSpMk id="43" creationId="{2CD4B601-E18B-EEB9-CE0B-24F854BE3972}"/>
-          </ac:cxnSpMkLst>
-        </pc:cxnChg>
-        <pc:cxnChg chg="mod">
-          <ac:chgData name="Andre Neumann" userId="e07587b9-5803-4dd8-acfc-2a6eb396eb4f" providerId="ADAL" clId="{EFB5112A-B092-46D3-986A-F24FFE20BB19}" dt="2024-07-09T08:08:03.673" v="914" actId="1076"/>
-          <ac:cxnSpMkLst>
-            <pc:docMk/>
-            <pc:sldMk cId="3349967969" sldId="256"/>
-            <ac:cxnSpMk id="46" creationId="{95D725D0-3B02-60BB-9D35-F459378D56AA}"/>
-          </ac:cxnSpMkLst>
-        </pc:cxnChg>
-        <pc:cxnChg chg="mod">
-          <ac:chgData name="Andre Neumann" userId="e07587b9-5803-4dd8-acfc-2a6eb396eb4f" providerId="ADAL" clId="{EFB5112A-B092-46D3-986A-F24FFE20BB19}" dt="2024-07-09T08:08:03.673" v="914" actId="1076"/>
-          <ac:cxnSpMkLst>
-            <pc:docMk/>
-            <pc:sldMk cId="3349967969" sldId="256"/>
-            <ac:cxnSpMk id="48" creationId="{8283869D-2B8D-D00F-130D-0D499A27FB66}"/>
-          </ac:cxnSpMkLst>
-        </pc:cxnChg>
-        <pc:cxnChg chg="mod">
-          <ac:chgData name="Andre Neumann" userId="e07587b9-5803-4dd8-acfc-2a6eb396eb4f" providerId="ADAL" clId="{EFB5112A-B092-46D3-986A-F24FFE20BB19}" dt="2024-07-09T08:08:03.673" v="914" actId="1076"/>
-          <ac:cxnSpMkLst>
-            <pc:docMk/>
-            <pc:sldMk cId="3349967969" sldId="256"/>
-            <ac:cxnSpMk id="49" creationId="{BCC2648A-29D0-CC8A-8DDA-34A0F2195687}"/>
-          </ac:cxnSpMkLst>
-        </pc:cxnChg>
-        <pc:cxnChg chg="mod">
-          <ac:chgData name="Andre Neumann" userId="e07587b9-5803-4dd8-acfc-2a6eb396eb4f" providerId="ADAL" clId="{EFB5112A-B092-46D3-986A-F24FFE20BB19}" dt="2024-07-09T08:08:03.673" v="914" actId="1076"/>
-          <ac:cxnSpMkLst>
-            <pc:docMk/>
-            <pc:sldMk cId="3349967969" sldId="256"/>
-            <ac:cxnSpMk id="51" creationId="{BD886452-791B-4A49-5797-AB7CDE4A2018}"/>
-          </ac:cxnSpMkLst>
-        </pc:cxnChg>
-        <pc:cxnChg chg="mod">
-          <ac:chgData name="Andre Neumann" userId="e07587b9-5803-4dd8-acfc-2a6eb396eb4f" providerId="ADAL" clId="{EFB5112A-B092-46D3-986A-F24FFE20BB19}" dt="2024-07-09T08:08:03.673" v="914" actId="1076"/>
-          <ac:cxnSpMkLst>
-            <pc:docMk/>
-            <pc:sldMk cId="3349967969" sldId="256"/>
-            <ac:cxnSpMk id="52" creationId="{4F4AAA81-84D9-CA01-A1B5-4E0DB8AC21C2}"/>
-          </ac:cxnSpMkLst>
-        </pc:cxnChg>
-        <pc:cxnChg chg="mod">
-          <ac:chgData name="Andre Neumann" userId="e07587b9-5803-4dd8-acfc-2a6eb396eb4f" providerId="ADAL" clId="{EFB5112A-B092-46D3-986A-F24FFE20BB19}" dt="2024-07-09T08:08:03.673" v="914" actId="1076"/>
-          <ac:cxnSpMkLst>
-            <pc:docMk/>
-            <pc:sldMk cId="3349967969" sldId="256"/>
-            <ac:cxnSpMk id="53" creationId="{1C96E55B-CCB0-92DB-CA2E-A614CFFAE6B5}"/>
-          </ac:cxnSpMkLst>
-        </pc:cxnChg>
-        <pc:cxnChg chg="mod">
-          <ac:chgData name="Andre Neumann" userId="e07587b9-5803-4dd8-acfc-2a6eb396eb4f" providerId="ADAL" clId="{EFB5112A-B092-46D3-986A-F24FFE20BB19}" dt="2024-07-09T08:08:03.673" v="914" actId="1076"/>
-          <ac:cxnSpMkLst>
-            <pc:docMk/>
-            <pc:sldMk cId="3349967969" sldId="256"/>
-            <ac:cxnSpMk id="54" creationId="{0AE6A1D0-A93E-555A-EF72-231D3343D973}"/>
-          </ac:cxnSpMkLst>
-        </pc:cxnChg>
-        <pc:cxnChg chg="mod">
-          <ac:chgData name="Andre Neumann" userId="e07587b9-5803-4dd8-acfc-2a6eb396eb4f" providerId="ADAL" clId="{EFB5112A-B092-46D3-986A-F24FFE20BB19}" dt="2024-07-09T08:08:03.673" v="914" actId="1076"/>
-          <ac:cxnSpMkLst>
-            <pc:docMk/>
-            <pc:sldMk cId="3349967969" sldId="256"/>
-            <ac:cxnSpMk id="55" creationId="{AD667363-E939-5889-163C-3AE30C3E3C6E}"/>
-          </ac:cxnSpMkLst>
-        </pc:cxnChg>
       </pc:sldChg>
     </pc:docChg>
   </pc:docChgLst>
@@ -859,7 +288,7 @@
           <a:p>
             <a:fld id="{7BD5971E-5F5D-4684-AD15-058E381002C0}" type="datetimeFigureOut">
               <a:rPr lang="de-DE" smtClean="0"/>
-              <a:t>09.07.2024</a:t>
+              <a:t>17.03.2025</a:t>
             </a:fld>
             <a:endParaRPr lang="de-DE"/>
           </a:p>
@@ -1029,7 +458,7 @@
           <a:p>
             <a:fld id="{7BD5971E-5F5D-4684-AD15-058E381002C0}" type="datetimeFigureOut">
               <a:rPr lang="de-DE" smtClean="0"/>
-              <a:t>09.07.2024</a:t>
+              <a:t>17.03.2025</a:t>
             </a:fld>
             <a:endParaRPr lang="de-DE"/>
           </a:p>
@@ -1209,7 +638,7 @@
           <a:p>
             <a:fld id="{7BD5971E-5F5D-4684-AD15-058E381002C0}" type="datetimeFigureOut">
               <a:rPr lang="de-DE" smtClean="0"/>
-              <a:t>09.07.2024</a:t>
+              <a:t>17.03.2025</a:t>
             </a:fld>
             <a:endParaRPr lang="de-DE"/>
           </a:p>
@@ -1379,7 +808,7 @@
           <a:p>
             <a:fld id="{7BD5971E-5F5D-4684-AD15-058E381002C0}" type="datetimeFigureOut">
               <a:rPr lang="de-DE" smtClean="0"/>
-              <a:t>09.07.2024</a:t>
+              <a:t>17.03.2025</a:t>
             </a:fld>
             <a:endParaRPr lang="de-DE"/>
           </a:p>
@@ -1625,7 +1054,7 @@
           <a:p>
             <a:fld id="{7BD5971E-5F5D-4684-AD15-058E381002C0}" type="datetimeFigureOut">
               <a:rPr lang="de-DE" smtClean="0"/>
-              <a:t>09.07.2024</a:t>
+              <a:t>17.03.2025</a:t>
             </a:fld>
             <a:endParaRPr lang="de-DE"/>
           </a:p>
@@ -1857,7 +1286,7 @@
           <a:p>
             <a:fld id="{7BD5971E-5F5D-4684-AD15-058E381002C0}" type="datetimeFigureOut">
               <a:rPr lang="de-DE" smtClean="0"/>
-              <a:t>09.07.2024</a:t>
+              <a:t>17.03.2025</a:t>
             </a:fld>
             <a:endParaRPr lang="de-DE"/>
           </a:p>
@@ -2224,7 +1653,7 @@
           <a:p>
             <a:fld id="{7BD5971E-5F5D-4684-AD15-058E381002C0}" type="datetimeFigureOut">
               <a:rPr lang="de-DE" smtClean="0"/>
-              <a:t>09.07.2024</a:t>
+              <a:t>17.03.2025</a:t>
             </a:fld>
             <a:endParaRPr lang="de-DE"/>
           </a:p>
@@ -2342,7 +1771,7 @@
           <a:p>
             <a:fld id="{7BD5971E-5F5D-4684-AD15-058E381002C0}" type="datetimeFigureOut">
               <a:rPr lang="de-DE" smtClean="0"/>
-              <a:t>09.07.2024</a:t>
+              <a:t>17.03.2025</a:t>
             </a:fld>
             <a:endParaRPr lang="de-DE"/>
           </a:p>
@@ -2437,7 +1866,7 @@
           <a:p>
             <a:fld id="{7BD5971E-5F5D-4684-AD15-058E381002C0}" type="datetimeFigureOut">
               <a:rPr lang="de-DE" smtClean="0"/>
-              <a:t>09.07.2024</a:t>
+              <a:t>17.03.2025</a:t>
             </a:fld>
             <a:endParaRPr lang="de-DE"/>
           </a:p>
@@ -2714,7 +2143,7 @@
           <a:p>
             <a:fld id="{7BD5971E-5F5D-4684-AD15-058E381002C0}" type="datetimeFigureOut">
               <a:rPr lang="de-DE" smtClean="0"/>
-              <a:t>09.07.2024</a:t>
+              <a:t>17.03.2025</a:t>
             </a:fld>
             <a:endParaRPr lang="de-DE"/>
           </a:p>
@@ -2971,7 +2400,7 @@
           <a:p>
             <a:fld id="{7BD5971E-5F5D-4684-AD15-058E381002C0}" type="datetimeFigureOut">
               <a:rPr lang="de-DE" smtClean="0"/>
-              <a:t>09.07.2024</a:t>
+              <a:t>17.03.2025</a:t>
             </a:fld>
             <a:endParaRPr lang="de-DE"/>
           </a:p>
@@ -3184,7 +2613,7 @@
           <a:p>
             <a:fld id="{7BD5971E-5F5D-4684-AD15-058E381002C0}" type="datetimeFigureOut">
               <a:rPr lang="de-DE" smtClean="0"/>
-              <a:t>09.07.2024</a:t>
+              <a:t>17.03.2025</a:t>
             </a:fld>
             <a:endParaRPr lang="de-DE"/>
           </a:p>
@@ -7318,9 +6747,7 @@
               <a:rPr lang="de-DE" sz="1100" b="1" u="sng" cap="none" spc="0" dirty="0">
                 <a:ln w="0"/>
                 <a:solidFill>
-                  <a:schemeClr val="bg1">
-                    <a:lumMod val="65000"/>
-                  </a:schemeClr>
+                  <a:schemeClr val="tx1"/>
                 </a:solidFill>
               </a:rPr>
               <a:t>Hinweise zur RGB-LED:</a:t>
@@ -7331,9 +6758,7 @@
             <a:endParaRPr lang="de-DE" sz="1000" i="1" dirty="0">
               <a:ln w="0"/>
               <a:solidFill>
-                <a:schemeClr val="bg1">
-                  <a:lumMod val="65000"/>
-                </a:schemeClr>
+                <a:schemeClr val="tx1"/>
               </a:solidFill>
             </a:endParaRPr>
           </a:p>
@@ -7343,9 +6768,7 @@
               <a:rPr lang="de-DE" sz="1000" b="0" i="1" cap="none" spc="0" dirty="0">
                 <a:ln w="0"/>
                 <a:solidFill>
-                  <a:schemeClr val="bg1">
-                    <a:lumMod val="65000"/>
-                  </a:schemeClr>
+                  <a:schemeClr val="tx1"/>
                 </a:solidFill>
               </a:rPr>
               <a:t>Die LED hat eine gemeinsa</a:t>
@@ -7354,9 +6777,7 @@
               <a:rPr lang="de-DE" sz="1000" i="1" dirty="0">
                 <a:ln w="0"/>
                 <a:solidFill>
-                  <a:schemeClr val="bg1">
-                    <a:lumMod val="65000"/>
-                  </a:schemeClr>
+                  <a:schemeClr val="tx1"/>
                 </a:solidFill>
               </a:rPr>
               <a:t>me Anode. Das bedeutet, dass an der Anode konstant 3,3V anliegen müssen.</a:t>
@@ -7367,9 +6788,7 @@
             <a:endParaRPr lang="de-DE" sz="1000" b="0" i="1" cap="none" spc="0" dirty="0">
               <a:ln w="0"/>
               <a:solidFill>
-                <a:schemeClr val="bg1">
-                  <a:lumMod val="65000"/>
-                </a:schemeClr>
+                <a:schemeClr val="tx1"/>
               </a:solidFill>
             </a:endParaRPr>
           </a:p>
@@ -7379,9 +6798,7 @@
               <a:rPr lang="de-DE" sz="1000" i="1" dirty="0">
                 <a:ln w="0"/>
                 <a:solidFill>
-                  <a:schemeClr val="bg1">
-                    <a:lumMod val="65000"/>
-                  </a:schemeClr>
+                  <a:schemeClr val="tx1"/>
                 </a:solidFill>
               </a:rPr>
               <a:t>An den Kathoden stecken die Widerstände, danach wird die Kathode mit den GPIO-Pins des Raspberry Pi verbunden.</a:t>
@@ -7392,9 +6809,7 @@
             <a:endParaRPr lang="de-DE" sz="1000" b="0" i="1" cap="none" spc="0" dirty="0">
               <a:ln w="0"/>
               <a:solidFill>
-                <a:schemeClr val="bg1">
-                  <a:lumMod val="65000"/>
-                </a:schemeClr>
+                <a:schemeClr val="tx1"/>
               </a:solidFill>
             </a:endParaRPr>
           </a:p>
@@ -7404,9 +6819,7 @@
               <a:rPr lang="de-DE" sz="1000" i="1" dirty="0">
                 <a:ln w="0"/>
                 <a:solidFill>
-                  <a:schemeClr val="bg1">
-                    <a:lumMod val="65000"/>
-                  </a:schemeClr>
+                  <a:schemeClr val="tx1"/>
                 </a:solidFill>
               </a:rPr>
               <a:t>Wenn der GPIO-Pin des Raspberry Pi nun softwareseitig auf HIGH gestellt wird, liegen hier 3,3V an, sodass kein Strom fließen kann. Erst wenn der Pin auf LOW umgestellt wird, gibt es einen geschlossenen Stromkreis, der zum Leuchten der jeweiligen LED-Farbe führt.</a:t>
@@ -7417,9 +6830,7 @@
             <a:endParaRPr lang="de-DE" sz="1000" b="0" i="1" cap="none" spc="0" dirty="0">
               <a:ln w="0"/>
               <a:solidFill>
-                <a:schemeClr val="bg1">
-                  <a:lumMod val="65000"/>
-                </a:schemeClr>
+                <a:schemeClr val="tx1"/>
               </a:solidFill>
             </a:endParaRPr>
           </a:p>
@@ -7429,9 +6840,7 @@
               <a:rPr lang="de-DE" sz="1000" i="1" dirty="0">
                 <a:ln w="0"/>
                 <a:solidFill>
-                  <a:schemeClr val="bg1">
-                    <a:lumMod val="65000"/>
-                  </a:schemeClr>
+                  <a:schemeClr val="tx1"/>
                 </a:solidFill>
               </a:rPr>
               <a:t>Damit ist die Logik umgedreht zu den Single-Color-LEDs des Sets!</a:t>
@@ -7439,9 +6848,7 @@
             <a:endParaRPr lang="de-DE" sz="1000" b="0" i="1" cap="none" spc="0" dirty="0">
               <a:ln w="0"/>
               <a:solidFill>
-                <a:schemeClr val="bg1">
-                  <a:lumMod val="65000"/>
-                </a:schemeClr>
+                <a:schemeClr val="tx1"/>
               </a:solidFill>
             </a:endParaRPr>
           </a:p>

</xml_diff>